<commit_message>
updated images and tables
</commit_message>
<xml_diff>
--- a/tutorial/2d-images-and-tables.pptx
+++ b/tutorial/2d-images-and-tables.pptx
@@ -15,6 +15,9 @@
     <p:sldId id="263" r:id="rId9"/>
     <p:sldId id="264" r:id="rId10"/>
     <p:sldId id="265" r:id="rId11"/>
+    <p:sldId id="266" r:id="rId12"/>
+    <p:sldId id="267" r:id="rId13"/>
+    <p:sldId id="268" r:id="rId14"/>
   </p:sldIdLst>
   <p:sldSz cx="9144000" cy="6858000" type="screen4x3"/>
   <p:notesSz cx="6858000" cy="9144000"/>
@@ -3236,6 +3239,312 @@
             </a:pPr>
             <a:r>
               <a:rPr/>
+              <a:t>Linked</a:t>
+            </a:r>
+            <a:r>
+              <a:rPr/>
+              <a:t> </a:t>
+            </a:r>
+            <a:r>
+              <a:rPr/>
+              <a:t>image</a:t>
+            </a:r>
+          </a:p>
+        </p:txBody>
+      </p:sp>
+      <p:pic>
+        <p:nvPicPr>
+          <p:cNvPr descr="r4ds.png" id="0" name="Picture 1">
+            <a:hlinkClick r:id="rId3"/>
+          </p:cNvPr>
+          <p:cNvPicPr>
+            <a:picLocks noGrp="1" noChangeAspect="1"/>
+          </p:cNvPicPr>
+          <p:nvPr/>
+        </p:nvPicPr>
+        <p:blipFill>
+          <a:blip r:embed="rId2"/>
+          <a:stretch>
+            <a:fillRect/>
+          </a:stretch>
+        </p:blipFill>
+        <p:spPr bwMode="auto">
+          <a:xfrm>
+            <a:off x="3238500" y="1600200"/>
+            <a:ext cx="2679700" cy="4013200"/>
+          </a:xfrm>
+          <a:prstGeom prst="rect">
+            <a:avLst/>
+          </a:prstGeom>
+          <a:noFill/>
+          <a:ln w="9525">
+            <a:noFill/>
+            <a:headEnd/>
+            <a:tailEnd/>
+          </a:ln>
+        </p:spPr>
+      </p:pic>
+      <p:sp>
+        <p:nvSpPr>
+          <p:cNvPr id="1" name="TextBox 3"/>
+          <p:cNvSpPr txBox="1"/>
+          <p:nvPr/>
+        </p:nvSpPr>
+        <p:spPr>
+          <a:xfrm>
+            <a:off x="457200" y="5613400"/>
+            <a:ext cx="8229600" cy="508000"/>
+          </a:xfrm>
+          <a:prstGeom prst="rect">
+            <a:avLst/>
+          </a:prstGeom>
+          <a:noFill/>
+        </p:spPr>
+        <p:txBody>
+          <a:bodyPr/>
+          <a:lstStyle/>
+          <a:p>
+            <a:pPr lvl="0" marL="0" indent="0" algn="ctr">
+              <a:buNone/>
+            </a:pPr>
+            <a:r>
+              <a:rPr/>
+              <a:t>Click</a:t>
+            </a:r>
+            <a:r>
+              <a:rPr/>
+              <a:t> </a:t>
+            </a:r>
+            <a:r>
+              <a:rPr/>
+              <a:t>to</a:t>
+            </a:r>
+            <a:r>
+              <a:rPr/>
+              <a:t> </a:t>
+            </a:r>
+            <a:r>
+              <a:rPr/>
+              <a:t>open</a:t>
+            </a:r>
+            <a:r>
+              <a:rPr/>
+              <a:t> </a:t>
+            </a:r>
+            <a:r>
+              <a:rPr/>
+              <a:t>R</a:t>
+            </a:r>
+            <a:r>
+              <a:rPr/>
+              <a:t> </a:t>
+            </a:r>
+            <a:r>
+              <a:rPr/>
+              <a:t>for</a:t>
+            </a:r>
+            <a:r>
+              <a:rPr/>
+              <a:t> </a:t>
+            </a:r>
+            <a:r>
+              <a:rPr/>
+              <a:t>data</a:t>
+            </a:r>
+            <a:r>
+              <a:rPr/>
+              <a:t> </a:t>
+            </a:r>
+            <a:r>
+              <a:rPr/>
+              <a:t>science</a:t>
+            </a:r>
+          </a:p>
+        </p:txBody>
+      </p:sp>
+    </p:spTree>
+  </p:cSld>
+</p:sld>
+</file>
+
+<file path=ppt/slides/slide11.xml><?xml version="1.0" encoding="utf-8"?>
+<p:sld xmlns:a="http://schemas.openxmlformats.org/drawingml/2006/main" xmlns:r="http://schemas.openxmlformats.org/officeDocument/2006/relationships" xmlns:p="http://schemas.openxmlformats.org/presentationml/2006/main">
+  <p:cSld>
+    <p:spTree>
+      <p:nvGrpSpPr>
+        <p:cNvPr id="1" name=""/>
+        <p:cNvGrpSpPr/>
+        <p:nvPr/>
+      </p:nvGrpSpPr>
+      <p:grpSpPr>
+        <a:xfrm>
+          <a:off x="0" y="0"/>
+          <a:ext cx="0" cy="0"/>
+          <a:chOff x="0" y="0"/>
+          <a:chExt cx="0" cy="0"/>
+        </a:xfrm>
+      </p:grpSpPr>
+      <p:sp>
+        <p:nvSpPr>
+          <p:cNvPr id="2" name="Title 1"/>
+          <p:cNvSpPr>
+            <a:spLocks noGrp="1"/>
+          </p:cNvSpPr>
+          <p:nvPr>
+            <p:ph type="title"/>
+          </p:nvPr>
+        </p:nvSpPr>
+        <p:spPr>
+          <a:xfrm>
+            <a:off x="722313" y="4406900"/>
+            <a:ext cx="7772400" cy="1362075"/>
+          </a:xfrm>
+        </p:spPr>
+        <p:txBody>
+          <a:bodyPr/>
+          <a:lstStyle/>
+          <a:p>
+            <a:pPr lvl="0" marL="0" indent="0">
+              <a:buNone/>
+            </a:pPr>
+            <a:r>
+              <a:rPr/>
+              <a:t>Tables</a:t>
+            </a:r>
+          </a:p>
+        </p:txBody>
+      </p:sp>
+    </p:spTree>
+  </p:cSld>
+</p:sld>
+</file>
+
+<file path=ppt/slides/slide12.xml><?xml version="1.0" encoding="utf-8"?>
+<p:sld xmlns:a="http://schemas.openxmlformats.org/drawingml/2006/main" xmlns:r="http://schemas.openxmlformats.org/officeDocument/2006/relationships" xmlns:p="http://schemas.openxmlformats.org/presentationml/2006/main">
+  <p:cSld>
+    <p:spTree>
+      <p:nvGrpSpPr>
+        <p:cNvPr id="1" name=""/>
+        <p:cNvGrpSpPr/>
+        <p:nvPr/>
+      </p:nvGrpSpPr>
+      <p:grpSpPr>
+        <a:xfrm>
+          <a:off x="0" y="0"/>
+          <a:ext cx="0" cy="0"/>
+          <a:chOff x="0" y="0"/>
+          <a:chExt cx="0" cy="0"/>
+        </a:xfrm>
+      </p:grpSpPr>
+      <p:sp>
+        <p:nvSpPr>
+          <p:cNvPr id="2" name="Title 1"/>
+          <p:cNvSpPr>
+            <a:spLocks noGrp="1"/>
+          </p:cNvSpPr>
+          <p:nvPr>
+            <p:ph type="title"/>
+          </p:nvPr>
+        </p:nvSpPr>
+        <p:spPr/>
+        <p:txBody>
+          <a:bodyPr/>
+          <a:lstStyle/>
+          <a:p>
+            <a:pPr lvl="0" marL="0" indent="0">
+              <a:buNone/>
+            </a:pPr>
+            <a:r>
+              <a:rPr/>
+              <a:t>Tables</a:t>
+            </a:r>
+          </a:p>
+        </p:txBody>
+      </p:sp>
+      <p:sp>
+        <p:nvSpPr>
+          <p:cNvPr id="3" name="Content Placeholder 2"/>
+          <p:cNvSpPr>
+            <a:spLocks noGrp="1"/>
+          </p:cNvSpPr>
+          <p:nvPr>
+            <p:ph idx="1"/>
+          </p:nvPr>
+        </p:nvSpPr>
+        <p:spPr/>
+        <p:txBody>
+          <a:bodyPr/>
+          <a:lstStyle/>
+          <a:p>
+            <a:pPr lvl="0" marL="0" indent="0">
+              <a:buNone/>
+            </a:pPr>
+            <a:r>
+              <a:rPr/>
+              <a:t>Tables render natively in PowerPoint and pick up the style defined by the reference template.</a:t>
+            </a:r>
+          </a:p>
+          <a:p>
+            <a:pPr lvl="0" marL="1270000" indent="0">
+              <a:buNone/>
+            </a:pPr>
+            <a:r>
+              <a:rPr sz="1800">
+                <a:latin typeface="Courier"/>
+              </a:rPr>
+              <a:t>
+ manufacturer    displ   hwy     class
+-------------    ------  -----  ---------
+        audi     1.8     29      compact
+   chevrolet     5.3     20        suv
+       dodge     2.4     24      minivan
+Table:  Demonstration of simple table syntax.</a:t>
+            </a:r>
+          </a:p>
+        </p:txBody>
+      </p:sp>
+    </p:spTree>
+  </p:cSld>
+</p:sld>
+</file>
+
+<file path=ppt/slides/slide13.xml><?xml version="1.0" encoding="utf-8"?>
+<p:sld xmlns:a="http://schemas.openxmlformats.org/drawingml/2006/main" xmlns:r="http://schemas.openxmlformats.org/officeDocument/2006/relationships" xmlns:p="http://schemas.openxmlformats.org/presentationml/2006/main">
+  <p:cSld>
+    <p:spTree>
+      <p:nvGrpSpPr>
+        <p:cNvPr id="1" name=""/>
+        <p:cNvGrpSpPr/>
+        <p:nvPr/>
+      </p:nvGrpSpPr>
+      <p:grpSpPr>
+        <a:xfrm>
+          <a:off x="0" y="0"/>
+          <a:ext cx="0" cy="0"/>
+          <a:chOff x="0" y="0"/>
+          <a:chExt cx="0" cy="0"/>
+        </a:xfrm>
+      </p:grpSpPr>
+      <p:sp>
+        <p:nvSpPr>
+          <p:cNvPr id="2" name="Title 1"/>
+          <p:cNvSpPr>
+            <a:spLocks noGrp="1"/>
+          </p:cNvSpPr>
+          <p:nvPr>
+            <p:ph type="title"/>
+          </p:nvPr>
+        </p:nvSpPr>
+        <p:spPr/>
+        <p:txBody>
+          <a:bodyPr/>
+          <a:lstStyle/>
+          <a:p>
+            <a:pPr lvl="0" marL="0" indent="0">
+              <a:buNone/>
+            </a:pPr>
+            <a:r>
+              <a:rPr/>
               <a:t>Example</a:t>
             </a:r>
           </a:p>
@@ -3253,7 +3562,7 @@
         </p:nvGraphicFramePr>
         <p:xfrm>
           <a:off x="457200" y="1600200"/>
-          <a:ext cx="8229600" cy="4521200"/>
+          <a:ext cx="8229600" cy="4013200"/>
         </p:xfrm>
         <a:graphic>
           <a:graphicData uri="http://schemas.openxmlformats.org/drawingml/2006/table">
@@ -3523,6 +3832,68 @@
           </a:graphicData>
         </a:graphic>
       </p:graphicFrame>
+      <p:sp>
+        <p:nvSpPr>
+          <p:cNvPr id="1" name="TextBox 3"/>
+          <p:cNvSpPr txBox="1"/>
+          <p:nvPr/>
+        </p:nvSpPr>
+        <p:spPr>
+          <a:xfrm>
+            <a:off x="457200" y="5613400"/>
+            <a:ext cx="8229600" cy="508000"/>
+          </a:xfrm>
+          <a:prstGeom prst="rect">
+            <a:avLst/>
+          </a:prstGeom>
+          <a:noFill/>
+        </p:spPr>
+        <p:txBody>
+          <a:bodyPr/>
+          <a:lstStyle/>
+          <a:p>
+            <a:pPr lvl="0" marL="0" indent="0" algn="ctr">
+              <a:buNone/>
+            </a:pPr>
+            <a:r>
+              <a:rPr/>
+              <a:t>Demonstration</a:t>
+            </a:r>
+            <a:r>
+              <a:rPr/>
+              <a:t> </a:t>
+            </a:r>
+            <a:r>
+              <a:rPr/>
+              <a:t>of</a:t>
+            </a:r>
+            <a:r>
+              <a:rPr/>
+              <a:t> </a:t>
+            </a:r>
+            <a:r>
+              <a:rPr/>
+              <a:t>simple</a:t>
+            </a:r>
+            <a:r>
+              <a:rPr/>
+              <a:t> </a:t>
+            </a:r>
+            <a:r>
+              <a:rPr/>
+              <a:t>table</a:t>
+            </a:r>
+            <a:r>
+              <a:rPr/>
+              <a:t> </a:t>
+            </a:r>
+            <a:r>
+              <a:rPr/>
+              <a:t>syntax.</a:t>
+            </a:r>
+          </a:p>
+        </p:txBody>
+      </p:sp>
     </p:spTree>
   </p:cSld>
 </p:sld>
@@ -3632,7 +4003,12 @@
             <p:ph type="title"/>
           </p:nvPr>
         </p:nvSpPr>
-        <p:spPr/>
+        <p:spPr>
+          <a:xfrm>
+            <a:off x="722313" y="4406900"/>
+            <a:ext cx="7772400" cy="1362075"/>
+          </a:xfrm>
+        </p:spPr>
         <p:txBody>
           <a:bodyPr/>
           <a:lstStyle/>
@@ -3643,50 +4019,6 @@
             <a:r>
               <a:rPr/>
               <a:t>Images</a:t>
-            </a:r>
-          </a:p>
-        </p:txBody>
-      </p:sp>
-      <p:sp>
-        <p:nvSpPr>
-          <p:cNvPr id="3" name="Content Placeholder 2"/>
-          <p:cNvSpPr>
-            <a:spLocks noGrp="1"/>
-          </p:cNvSpPr>
-          <p:nvPr>
-            <p:ph idx="1"/>
-          </p:nvPr>
-        </p:nvSpPr>
-        <p:spPr/>
-        <p:txBody>
-          <a:bodyPr/>
-          <a:lstStyle/>
-          <a:p>
-            <a:pPr lvl="1"/>
-            <a:r>
-              <a:rPr/>
-              <a:t>Images will be scaled automatically to fit the slide.</a:t>
-            </a:r>
-          </a:p>
-          <a:p>
-            <a:pPr lvl="1"/>
-            <a:r>
-              <a:rPr/>
-              <a:t>You can render images from file or from the web.</a:t>
-            </a:r>
-          </a:p>
-          <a:p>
-            <a:pPr lvl="1"/>
-            <a:r>
-              <a:rPr/>
-              <a:t>Captions will render below the image.</a:t>
-            </a:r>
-          </a:p>
-          <a:p>
-            <a:pPr lvl="1"/>
-            <a:r>
-              <a:rPr/>
-              <a:t>You can add a link to the caption or to the image itself.</a:t>
             </a:r>
           </a:p>
         </p:txBody>
@@ -3733,7 +4065,7 @@
             </a:pPr>
             <a:r>
               <a:rPr/>
-              <a:t>Examples</a:t>
+              <a:t>Images</a:t>
             </a:r>
           </a:p>
         </p:txBody>
@@ -3753,23 +4085,31 @@
           <a:bodyPr/>
           <a:lstStyle/>
           <a:p>
-            <a:pPr lvl="0" marL="1270000" indent="0">
-              <a:buNone/>
-            </a:pPr>
-            <a:r>
-              <a:rPr sz="1800">
-                <a:latin typeface="Courier"/>
-              </a:rPr>
-              <a:t># image from file
-![](file)
-# image from web
-![](URL)
-# linked image
-[![](image)](link)
-# plain caption
-![caption](image)
-# linked caption
-![[caption](link)](image)</a:t>
+            <a:pPr lvl="1"/>
+            <a:r>
+              <a:rPr/>
+              <a:t>Images will be scaled automatically to fit the slide.</a:t>
+            </a:r>
+          </a:p>
+          <a:p>
+            <a:pPr lvl="1"/>
+            <a:r>
+              <a:rPr/>
+              <a:t>You can render images from file or from the web.</a:t>
+            </a:r>
+          </a:p>
+          <a:p>
+            <a:pPr lvl="1"/>
+            <a:r>
+              <a:rPr/>
+              <a:t>Captions will render below the image.</a:t>
+            </a:r>
+          </a:p>
+          <a:p>
+            <a:pPr lvl="1"/>
+            <a:r>
+              <a:rPr/>
+              <a:t>You can add a link to the caption or to the image itself.</a:t>
             </a:r>
           </a:p>
         </p:txBody>
@@ -3816,7 +4156,90 @@
             </a:pPr>
             <a:r>
               <a:rPr/>
-              <a:t>Plain</a:t>
+              <a:t>Examples</a:t>
+            </a:r>
+          </a:p>
+        </p:txBody>
+      </p:sp>
+      <p:sp>
+        <p:nvSpPr>
+          <p:cNvPr id="3" name="Content Placeholder 2"/>
+          <p:cNvSpPr>
+            <a:spLocks noGrp="1"/>
+          </p:cNvSpPr>
+          <p:nvPr>
+            <p:ph idx="1"/>
+          </p:nvPr>
+        </p:nvSpPr>
+        <p:spPr/>
+        <p:txBody>
+          <a:bodyPr/>
+          <a:lstStyle/>
+          <a:p>
+            <a:pPr lvl="0" marL="1270000" indent="0">
+              <a:buNone/>
+            </a:pPr>
+            <a:r>
+              <a:rPr sz="1800">
+                <a:latin typeface="Courier"/>
+              </a:rPr>
+              <a:t># image from file
+![](file)
+# image from web
+![](URL)
+# plain caption
+![caption](image)
+# linked caption
+![[caption](link)](image)
+# linked image
+[![](image)](link)</a:t>
+            </a:r>
+          </a:p>
+        </p:txBody>
+      </p:sp>
+    </p:spTree>
+  </p:cSld>
+</p:sld>
+</file>
+
+<file path=ppt/slides/slide6.xml><?xml version="1.0" encoding="utf-8"?>
+<p:sld xmlns:a="http://schemas.openxmlformats.org/drawingml/2006/main" xmlns:r="http://schemas.openxmlformats.org/officeDocument/2006/relationships" xmlns:p="http://schemas.openxmlformats.org/presentationml/2006/main">
+  <p:cSld>
+    <p:spTree>
+      <p:nvGrpSpPr>
+        <p:cNvPr id="1" name=""/>
+        <p:cNvGrpSpPr/>
+        <p:nvPr/>
+      </p:nvGrpSpPr>
+      <p:grpSpPr>
+        <a:xfrm>
+          <a:off x="0" y="0"/>
+          <a:ext cx="0" cy="0"/>
+          <a:chOff x="0" y="0"/>
+          <a:chExt cx="0" cy="0"/>
+        </a:xfrm>
+      </p:grpSpPr>
+      <p:sp>
+        <p:nvSpPr>
+          <p:cNvPr id="2" name="Title 1"/>
+          <p:cNvSpPr>
+            <a:spLocks noGrp="1"/>
+          </p:cNvSpPr>
+          <p:nvPr>
+            <p:ph type="title"/>
+          </p:nvPr>
+        </p:nvSpPr>
+        <p:spPr/>
+        <p:txBody>
+          <a:bodyPr/>
+          <a:lstStyle/>
+          <a:p>
+            <a:pPr lvl="0" marL="0" indent="0">
+              <a:buNone/>
+            </a:pPr>
+            <a:r>
+              <a:rPr/>
+              <a:t>Image</a:t>
             </a:r>
             <a:r>
               <a:rPr/>
@@ -3824,7 +4247,15 @@
             </a:r>
             <a:r>
               <a:rPr/>
-              <a:t>Image</a:t>
+              <a:t>from</a:t>
+            </a:r>
+            <a:r>
+              <a:rPr/>
+              <a:t> </a:t>
+            </a:r>
+            <a:r>
+              <a:rPr/>
+              <a:t>file</a:t>
             </a:r>
           </a:p>
         </p:txBody>
@@ -3864,139 +4295,6 @@
 </p:sld>
 </file>
 
-<file path=ppt/slides/slide6.xml><?xml version="1.0" encoding="utf-8"?>
-<p:sld xmlns:a="http://schemas.openxmlformats.org/drawingml/2006/main" xmlns:r="http://schemas.openxmlformats.org/officeDocument/2006/relationships" xmlns:p="http://schemas.openxmlformats.org/presentationml/2006/main">
-  <p:cSld>
-    <p:spTree>
-      <p:nvGrpSpPr>
-        <p:cNvPr id="1" name=""/>
-        <p:cNvGrpSpPr/>
-        <p:nvPr/>
-      </p:nvGrpSpPr>
-      <p:grpSpPr>
-        <a:xfrm>
-          <a:off x="0" y="0"/>
-          <a:ext cx="0" cy="0"/>
-          <a:chOff x="0" y="0"/>
-          <a:chExt cx="0" cy="0"/>
-        </a:xfrm>
-      </p:grpSpPr>
-      <p:sp>
-        <p:nvSpPr>
-          <p:cNvPr id="2" name="Title 1"/>
-          <p:cNvSpPr>
-            <a:spLocks noGrp="1"/>
-          </p:cNvSpPr>
-          <p:nvPr>
-            <p:ph type="title"/>
-          </p:nvPr>
-        </p:nvSpPr>
-        <p:spPr/>
-        <p:txBody>
-          <a:bodyPr/>
-          <a:lstStyle/>
-          <a:p>
-            <a:pPr lvl="0" marL="0" indent="0">
-              <a:buNone/>
-            </a:pPr>
-            <a:r>
-              <a:rPr/>
-              <a:t>Linked</a:t>
-            </a:r>
-            <a:r>
-              <a:rPr/>
-              <a:t> </a:t>
-            </a:r>
-            <a:r>
-              <a:rPr/>
-              <a:t>image</a:t>
-            </a:r>
-          </a:p>
-        </p:txBody>
-      </p:sp>
-      <p:pic>
-        <p:nvPicPr>
-          <p:cNvPr descr="r4ds.png" id="0" name="Picture 1">
-            <a:hlinkClick r:id="rId3"/>
-          </p:cNvPr>
-          <p:cNvPicPr>
-            <a:picLocks noGrp="1" noChangeAspect="1"/>
-          </p:cNvPicPr>
-          <p:nvPr/>
-        </p:nvPicPr>
-        <p:blipFill>
-          <a:blip r:embed="rId2"/>
-          <a:stretch>
-            <a:fillRect/>
-          </a:stretch>
-        </p:blipFill>
-        <p:spPr bwMode="auto">
-          <a:xfrm>
-            <a:off x="3238500" y="1600200"/>
-            <a:ext cx="2679700" cy="4013200"/>
-          </a:xfrm>
-          <a:prstGeom prst="rect">
-            <a:avLst/>
-          </a:prstGeom>
-          <a:noFill/>
-          <a:ln w="9525">
-            <a:noFill/>
-            <a:headEnd/>
-            <a:tailEnd/>
-          </a:ln>
-        </p:spPr>
-      </p:pic>
-      <p:sp>
-        <p:nvSpPr>
-          <p:cNvPr id="1" name="TextBox 3"/>
-          <p:cNvSpPr txBox="1"/>
-          <p:nvPr/>
-        </p:nvSpPr>
-        <p:spPr>
-          <a:xfrm>
-            <a:off x="457200" y="5613400"/>
-            <a:ext cx="8229600" cy="508000"/>
-          </a:xfrm>
-          <a:prstGeom prst="rect">
-            <a:avLst/>
-          </a:prstGeom>
-          <a:noFill/>
-        </p:spPr>
-        <p:txBody>
-          <a:bodyPr/>
-          <a:lstStyle/>
-          <a:p>
-            <a:pPr lvl="0" marL="0" indent="0" algn="ctr">
-              <a:buNone/>
-            </a:pPr>
-            <a:r>
-              <a:rPr/>
-              <a:t>Click</a:t>
-            </a:r>
-            <a:r>
-              <a:rPr/>
-              <a:t> </a:t>
-            </a:r>
-            <a:r>
-              <a:rPr/>
-              <a:t>to</a:t>
-            </a:r>
-            <a:r>
-              <a:rPr/>
-              <a:t> </a:t>
-            </a:r>
-            <a:r>
-              <a:rPr/>
-              <a:t>open</a:t>
-            </a:r>
-          </a:p>
-        </p:txBody>
-      </p:sp>
-    </p:spTree>
-  </p:cSld>
-</p:sld>
-</file>
-
 <file path=ppt/slides/slide7.xml><?xml version="1.0" encoding="utf-8"?>
 <p:sld xmlns:a="http://schemas.openxmlformats.org/drawingml/2006/main" xmlns:r="http://schemas.openxmlformats.org/officeDocument/2006/relationships" xmlns:p="http://schemas.openxmlformats.org/presentationml/2006/main">
   <p:cSld>
@@ -4034,7 +4332,7 @@
             </a:pPr>
             <a:r>
               <a:rPr/>
-              <a:t>Linked</a:t>
+              <a:t>Image</a:t>
             </a:r>
             <a:r>
               <a:rPr/>
@@ -4042,160 +4340,15 @@
             </a:r>
             <a:r>
               <a:rPr/>
-              <a:t>caption</a:t>
-            </a:r>
-          </a:p>
-        </p:txBody>
-      </p:sp>
-      <p:pic>
-        <p:nvPicPr>
-          <p:cNvPr descr="r4ds.png" id="0" name="Picture 1"/>
-          <p:cNvPicPr>
-            <a:picLocks noGrp="1" noChangeAspect="1"/>
-          </p:cNvPicPr>
-          <p:nvPr/>
-        </p:nvPicPr>
-        <p:blipFill>
-          <a:blip r:embed="rId2"/>
-          <a:stretch>
-            <a:fillRect/>
-          </a:stretch>
-        </p:blipFill>
-        <p:spPr bwMode="auto">
-          <a:xfrm>
-            <a:off x="3238500" y="1600200"/>
-            <a:ext cx="2679700" cy="4013200"/>
-          </a:xfrm>
-          <a:prstGeom prst="rect">
-            <a:avLst/>
-          </a:prstGeom>
-          <a:noFill/>
-          <a:ln w="9525">
-            <a:noFill/>
-            <a:headEnd/>
-            <a:tailEnd/>
-          </a:ln>
-        </p:spPr>
-      </p:pic>
-      <p:sp>
-        <p:nvSpPr>
-          <p:cNvPr id="1" name="TextBox 3"/>
-          <p:cNvSpPr txBox="1"/>
-          <p:nvPr/>
-        </p:nvSpPr>
-        <p:spPr>
-          <a:xfrm>
-            <a:off x="457200" y="5613400"/>
-            <a:ext cx="8229600" cy="508000"/>
-          </a:xfrm>
-          <a:prstGeom prst="rect">
-            <a:avLst/>
-          </a:prstGeom>
-          <a:noFill/>
-        </p:spPr>
-        <p:txBody>
-          <a:bodyPr/>
-          <a:lstStyle/>
-          <a:p>
-            <a:pPr lvl="0" marL="0" indent="0" algn="ctr">
-              <a:buNone/>
-            </a:pPr>
-            <a:r>
-              <a:rPr>
-                <a:hlinkClick r:id="rId3"/>
-              </a:rPr>
-              <a:t>R</a:t>
-            </a:r>
-            <a:r>
-              <a:rPr>
-                <a:hlinkClick r:id="rId4"/>
-              </a:rPr>
+              <a:t>from</a:t>
+            </a:r>
+            <a:r>
+              <a:rPr/>
               <a:t> </a:t>
             </a:r>
             <a:r>
-              <a:rPr>
-                <a:hlinkClick r:id="rId5"/>
-              </a:rPr>
-              <a:t>for</a:t>
-            </a:r>
-            <a:r>
-              <a:rPr>
-                <a:hlinkClick r:id="rId6"/>
-              </a:rPr>
-              <a:t> </a:t>
-            </a:r>
-            <a:r>
-              <a:rPr>
-                <a:hlinkClick r:id="rId7"/>
-              </a:rPr>
-              <a:t>Data</a:t>
-            </a:r>
-            <a:r>
-              <a:rPr>
-                <a:hlinkClick r:id="rId8"/>
-              </a:rPr>
-              <a:t> </a:t>
-            </a:r>
-            <a:r>
-              <a:rPr>
-                <a:hlinkClick r:id="rId9"/>
-              </a:rPr>
-              <a:t>Science</a:t>
-            </a:r>
-          </a:p>
-        </p:txBody>
-      </p:sp>
-    </p:spTree>
-  </p:cSld>
-</p:sld>
-</file>
-
-<file path=ppt/slides/slide8.xml><?xml version="1.0" encoding="utf-8"?>
-<p:sld xmlns:a="http://schemas.openxmlformats.org/drawingml/2006/main" xmlns:r="http://schemas.openxmlformats.org/officeDocument/2006/relationships" xmlns:p="http://schemas.openxmlformats.org/presentationml/2006/main">
-  <p:cSld>
-    <p:spTree>
-      <p:nvGrpSpPr>
-        <p:cNvPr id="1" name=""/>
-        <p:cNvGrpSpPr/>
-        <p:nvPr/>
-      </p:nvGrpSpPr>
-      <p:grpSpPr>
-        <a:xfrm>
-          <a:off x="0" y="0"/>
-          <a:ext cx="0" cy="0"/>
-          <a:chOff x="0" y="0"/>
-          <a:chExt cx="0" cy="0"/>
-        </a:xfrm>
-      </p:grpSpPr>
-      <p:sp>
-        <p:nvSpPr>
-          <p:cNvPr id="2" name="Title 1"/>
-          <p:cNvSpPr>
-            <a:spLocks noGrp="1"/>
-          </p:cNvSpPr>
-          <p:nvPr>
-            <p:ph type="title"/>
-          </p:nvPr>
-        </p:nvSpPr>
-        <p:spPr/>
-        <p:txBody>
-          <a:bodyPr/>
-          <a:lstStyle/>
-          <a:p>
-            <a:pPr lvl="0" marL="0" indent="0">
-              <a:buNone/>
-            </a:pPr>
-            <a:r>
-              <a:rPr/>
-              <a:t>Web</a:t>
-            </a:r>
-            <a:r>
-              <a:rPr/>
-              <a:t> </a:t>
-            </a:r>
-            <a:r>
-              <a:rPr/>
-              <a:t>image</a:t>
+              <a:rPr/>
+              <a:t>web</a:t>
             </a:r>
           </a:p>
         </p:txBody>
@@ -4235,6 +4388,145 @@
 </p:sld>
 </file>
 
+<file path=ppt/slides/slide8.xml><?xml version="1.0" encoding="utf-8"?>
+<p:sld xmlns:a="http://schemas.openxmlformats.org/drawingml/2006/main" xmlns:r="http://schemas.openxmlformats.org/officeDocument/2006/relationships" xmlns:p="http://schemas.openxmlformats.org/presentationml/2006/main">
+  <p:cSld>
+    <p:spTree>
+      <p:nvGrpSpPr>
+        <p:cNvPr id="1" name=""/>
+        <p:cNvGrpSpPr/>
+        <p:nvPr/>
+      </p:nvGrpSpPr>
+      <p:grpSpPr>
+        <a:xfrm>
+          <a:off x="0" y="0"/>
+          <a:ext cx="0" cy="0"/>
+          <a:chOff x="0" y="0"/>
+          <a:chExt cx="0" cy="0"/>
+        </a:xfrm>
+      </p:grpSpPr>
+      <p:sp>
+        <p:nvSpPr>
+          <p:cNvPr id="2" name="Title 1"/>
+          <p:cNvSpPr>
+            <a:spLocks noGrp="1"/>
+          </p:cNvSpPr>
+          <p:nvPr>
+            <p:ph type="title"/>
+          </p:nvPr>
+        </p:nvSpPr>
+        <p:spPr/>
+        <p:txBody>
+          <a:bodyPr/>
+          <a:lstStyle/>
+          <a:p>
+            <a:pPr lvl="0" marL="0" indent="0">
+              <a:buNone/>
+            </a:pPr>
+            <a:r>
+              <a:rPr/>
+              <a:t>Plain</a:t>
+            </a:r>
+            <a:r>
+              <a:rPr/>
+              <a:t> </a:t>
+            </a:r>
+            <a:r>
+              <a:rPr/>
+              <a:t>caption</a:t>
+            </a:r>
+          </a:p>
+        </p:txBody>
+      </p:sp>
+      <p:pic>
+        <p:nvPicPr>
+          <p:cNvPr descr="r4ds.png" id="0" name="Picture 1"/>
+          <p:cNvPicPr>
+            <a:picLocks noGrp="1" noChangeAspect="1"/>
+          </p:cNvPicPr>
+          <p:nvPr/>
+        </p:nvPicPr>
+        <p:blipFill>
+          <a:blip r:embed="rId2"/>
+          <a:stretch>
+            <a:fillRect/>
+          </a:stretch>
+        </p:blipFill>
+        <p:spPr bwMode="auto">
+          <a:xfrm>
+            <a:off x="3238500" y="1600200"/>
+            <a:ext cx="2679700" cy="4013200"/>
+          </a:xfrm>
+          <a:prstGeom prst="rect">
+            <a:avLst/>
+          </a:prstGeom>
+          <a:noFill/>
+          <a:ln w="9525">
+            <a:noFill/>
+            <a:headEnd/>
+            <a:tailEnd/>
+          </a:ln>
+        </p:spPr>
+      </p:pic>
+      <p:sp>
+        <p:nvSpPr>
+          <p:cNvPr id="1" name="TextBox 3"/>
+          <p:cNvSpPr txBox="1"/>
+          <p:nvPr/>
+        </p:nvSpPr>
+        <p:spPr>
+          <a:xfrm>
+            <a:off x="457200" y="5613400"/>
+            <a:ext cx="8229600" cy="508000"/>
+          </a:xfrm>
+          <a:prstGeom prst="rect">
+            <a:avLst/>
+          </a:prstGeom>
+          <a:noFill/>
+        </p:spPr>
+        <p:txBody>
+          <a:bodyPr/>
+          <a:lstStyle/>
+          <a:p>
+            <a:pPr lvl="0" marL="0" indent="0" algn="ctr">
+              <a:buNone/>
+            </a:pPr>
+            <a:r>
+              <a:rPr/>
+              <a:t>R</a:t>
+            </a:r>
+            <a:r>
+              <a:rPr/>
+              <a:t> </a:t>
+            </a:r>
+            <a:r>
+              <a:rPr/>
+              <a:t>for</a:t>
+            </a:r>
+            <a:r>
+              <a:rPr/>
+              <a:t> </a:t>
+            </a:r>
+            <a:r>
+              <a:rPr/>
+              <a:t>data</a:t>
+            </a:r>
+            <a:r>
+              <a:rPr/>
+              <a:t> </a:t>
+            </a:r>
+            <a:r>
+              <a:rPr/>
+              <a:t>science</a:t>
+            </a:r>
+          </a:p>
+        </p:txBody>
+      </p:sp>
+    </p:spTree>
+  </p:cSld>
+</p:sld>
+</file>
+
 <file path=ppt/slides/slide9.xml><?xml version="1.0" encoding="utf-8"?>
 <p:sld xmlns:a="http://schemas.openxmlformats.org/drawingml/2006/main" xmlns:r="http://schemas.openxmlformats.org/officeDocument/2006/relationships" xmlns:p="http://schemas.openxmlformats.org/presentationml/2006/main">
   <p:cSld>
@@ -4272,48 +4564,113 @@
             </a:pPr>
             <a:r>
               <a:rPr/>
-              <a:t>Tables</a:t>
-            </a:r>
-          </a:p>
-        </p:txBody>
-      </p:sp>
-      <p:sp>
-        <p:nvSpPr>
-          <p:cNvPr id="3" name="Content Placeholder 2"/>
-          <p:cNvSpPr>
-            <a:spLocks noGrp="1"/>
-          </p:cNvSpPr>
-          <p:nvPr>
-            <p:ph idx="1"/>
-          </p:nvPr>
-        </p:nvSpPr>
-        <p:spPr/>
-        <p:txBody>
-          <a:bodyPr/>
-          <a:lstStyle/>
-          <a:p>
-            <a:pPr lvl="0" marL="0" indent="0">
+              <a:t>Linked</a:t>
+            </a:r>
+            <a:r>
+              <a:rPr/>
+              <a:t> </a:t>
+            </a:r>
+            <a:r>
+              <a:rPr/>
+              <a:t>caption</a:t>
+            </a:r>
+          </a:p>
+        </p:txBody>
+      </p:sp>
+      <p:pic>
+        <p:nvPicPr>
+          <p:cNvPr descr="r4ds.png" id="0" name="Picture 1"/>
+          <p:cNvPicPr>
+            <a:picLocks noGrp="1" noChangeAspect="1"/>
+          </p:cNvPicPr>
+          <p:nvPr/>
+        </p:nvPicPr>
+        <p:blipFill>
+          <a:blip r:embed="rId2"/>
+          <a:stretch>
+            <a:fillRect/>
+          </a:stretch>
+        </p:blipFill>
+        <p:spPr bwMode="auto">
+          <a:xfrm>
+            <a:off x="3238500" y="1600200"/>
+            <a:ext cx="2679700" cy="4013200"/>
+          </a:xfrm>
+          <a:prstGeom prst="rect">
+            <a:avLst/>
+          </a:prstGeom>
+          <a:noFill/>
+          <a:ln w="9525">
+            <a:noFill/>
+            <a:headEnd/>
+            <a:tailEnd/>
+          </a:ln>
+        </p:spPr>
+      </p:pic>
+      <p:sp>
+        <p:nvSpPr>
+          <p:cNvPr id="1" name="TextBox 3"/>
+          <p:cNvSpPr txBox="1"/>
+          <p:nvPr/>
+        </p:nvSpPr>
+        <p:spPr>
+          <a:xfrm>
+            <a:off x="457200" y="5613400"/>
+            <a:ext cx="8229600" cy="508000"/>
+          </a:xfrm>
+          <a:prstGeom prst="rect">
+            <a:avLst/>
+          </a:prstGeom>
+          <a:noFill/>
+        </p:spPr>
+        <p:txBody>
+          <a:bodyPr/>
+          <a:lstStyle/>
+          <a:p>
+            <a:pPr lvl="0" marL="0" indent="0" algn="ctr">
               <a:buNone/>
             </a:pPr>
             <a:r>
-              <a:rPr/>
-              <a:t>Tables render natively in PowerPoint and pick up the style defined by the reference template.</a:t>
-            </a:r>
-          </a:p>
-          <a:p>
-            <a:pPr lvl="0" marL="1270000" indent="0">
-              <a:buNone/>
-            </a:pPr>
-            <a:r>
-              <a:rPr sz="1800">
-                <a:latin typeface="Courier"/>
+              <a:rPr>
+                <a:hlinkClick r:id="rId3"/>
               </a:rPr>
-              <a:t>
- manufacturer    displ   hwy     class
--------------    ------  -----  ---------
-        audi     1.8     29      compact
-   chevrolet     5.3     20        suv
-       dodge     2.4     24      minivan</a:t>
+              <a:t>R</a:t>
+            </a:r>
+            <a:r>
+              <a:rPr>
+                <a:hlinkClick r:id="rId4"/>
+              </a:rPr>
+              <a:t> </a:t>
+            </a:r>
+            <a:r>
+              <a:rPr>
+                <a:hlinkClick r:id="rId5"/>
+              </a:rPr>
+              <a:t>for</a:t>
+            </a:r>
+            <a:r>
+              <a:rPr>
+                <a:hlinkClick r:id="rId6"/>
+              </a:rPr>
+              <a:t> </a:t>
+            </a:r>
+            <a:r>
+              <a:rPr>
+                <a:hlinkClick r:id="rId7"/>
+              </a:rPr>
+              <a:t>data</a:t>
+            </a:r>
+            <a:r>
+              <a:rPr>
+                <a:hlinkClick r:id="rId8"/>
+              </a:rPr>
+              <a:t> </a:t>
+            </a:r>
+            <a:r>
+              <a:rPr>
+                <a:hlinkClick r:id="rId9"/>
+              </a:rPr>
+              <a:t>science</a:t>
             </a:r>
           </a:p>
         </p:txBody>

</xml_diff>